<commit_message>
add all example JNI
</commit_message>
<xml_diff>
--- a/Training/Java native interface(JNI).pptx
+++ b/Training/Java native interface(JNI).pptx
@@ -134,7 +134,7 @@
   </p:defaultTextStyle>
   <p:extLst>
     <p:ext uri="{EFAFB233-063F-42B5-8137-9DF3F51BA10A}">
-      <p15:sldGuideLst xmlns="" xmlns:p15="http://schemas.microsoft.com/office/powerpoint/2012/main">
+      <p15:sldGuideLst xmlns:p15="http://schemas.microsoft.com/office/powerpoint/2012/main">
         <p15:guide id="1" orient="horz" pos="2160">
           <p15:clr>
             <a:srgbClr val="A4A3A4"/>
@@ -148,7 +148,7 @@
       </p15:sldGuideLst>
     </p:ext>
     <p:ext uri="{2D200454-40CA-4A62-9FC3-DE9A4176ACB9}">
-      <p15:notesGuideLst xmlns="" xmlns:p15="http://schemas.microsoft.com/office/powerpoint/2012/main"/>
+      <p15:notesGuideLst xmlns:p15="http://schemas.microsoft.com/office/powerpoint/2012/main"/>
     </p:ext>
   </p:extLst>
 </p:presentation>
@@ -236,7 +236,7 @@
           <a:p>
             <a:fld id="{8CED4065-FBD2-40E7-8D05-BB12B661EDC2}" type="datetimeFigureOut">
               <a:rPr lang="en-US" smtClean="0"/>
-              <a:t>11/16/2019</a:t>
+              <a:t>11/25/2019</a:t>
             </a:fld>
             <a:endParaRPr lang="en-US"/>
           </a:p>
@@ -3078,7 +3078,7 @@
           <a:p>
             <a:fld id="{A35A536D-C9E9-4036-ACC9-B934A19DE91F}" type="datetimeFigureOut">
               <a:rPr lang="en-US" smtClean="0"/>
-              <a:t>11/16/2019</a:t>
+              <a:t>11/25/2019</a:t>
             </a:fld>
             <a:endParaRPr lang="en-US"/>
           </a:p>
@@ -3255,7 +3255,7 @@
           <a:p>
             <a:fld id="{A35A536D-C9E9-4036-ACC9-B934A19DE91F}" type="datetimeFigureOut">
               <a:rPr lang="en-US" smtClean="0"/>
-              <a:t>11/16/2019</a:t>
+              <a:t>11/25/2019</a:t>
             </a:fld>
             <a:endParaRPr lang="en-US"/>
           </a:p>
@@ -3435,7 +3435,7 @@
           <a:p>
             <a:fld id="{A35A536D-C9E9-4036-ACC9-B934A19DE91F}" type="datetimeFigureOut">
               <a:rPr lang="en-US" smtClean="0"/>
-              <a:t>11/16/2019</a:t>
+              <a:t>11/25/2019</a:t>
             </a:fld>
             <a:endParaRPr lang="en-US"/>
           </a:p>
@@ -3605,7 +3605,7 @@
           <a:p>
             <a:fld id="{A35A536D-C9E9-4036-ACC9-B934A19DE91F}" type="datetimeFigureOut">
               <a:rPr lang="en-US" smtClean="0"/>
-              <a:t>11/16/2019</a:t>
+              <a:t>11/25/2019</a:t>
             </a:fld>
             <a:endParaRPr lang="en-US"/>
           </a:p>
@@ -3858,7 +3858,7 @@
           <a:p>
             <a:fld id="{A35A536D-C9E9-4036-ACC9-B934A19DE91F}" type="datetimeFigureOut">
               <a:rPr lang="en-US" smtClean="0"/>
-              <a:t>11/16/2019</a:t>
+              <a:t>11/25/2019</a:t>
             </a:fld>
             <a:endParaRPr lang="en-US"/>
           </a:p>
@@ -4097,7 +4097,7 @@
           <a:p>
             <a:fld id="{A35A536D-C9E9-4036-ACC9-B934A19DE91F}" type="datetimeFigureOut">
               <a:rPr lang="en-US" smtClean="0"/>
-              <a:t>11/16/2019</a:t>
+              <a:t>11/25/2019</a:t>
             </a:fld>
             <a:endParaRPr lang="en-US"/>
           </a:p>
@@ -4464,7 +4464,7 @@
           <a:p>
             <a:fld id="{A35A536D-C9E9-4036-ACC9-B934A19DE91F}" type="datetimeFigureOut">
               <a:rPr lang="en-US" smtClean="0"/>
-              <a:t>11/16/2019</a:t>
+              <a:t>11/25/2019</a:t>
             </a:fld>
             <a:endParaRPr lang="en-US"/>
           </a:p>
@@ -4582,7 +4582,7 @@
           <a:p>
             <a:fld id="{A35A536D-C9E9-4036-ACC9-B934A19DE91F}" type="datetimeFigureOut">
               <a:rPr lang="en-US" smtClean="0"/>
-              <a:t>11/16/2019</a:t>
+              <a:t>11/25/2019</a:t>
             </a:fld>
             <a:endParaRPr lang="en-US"/>
           </a:p>
@@ -4677,7 +4677,7 @@
           <a:p>
             <a:fld id="{A35A536D-C9E9-4036-ACC9-B934A19DE91F}" type="datetimeFigureOut">
               <a:rPr lang="en-US" smtClean="0"/>
-              <a:t>11/16/2019</a:t>
+              <a:t>11/25/2019</a:t>
             </a:fld>
             <a:endParaRPr lang="en-US"/>
           </a:p>
@@ -4954,7 +4954,7 @@
           <a:p>
             <a:fld id="{A35A536D-C9E9-4036-ACC9-B934A19DE91F}" type="datetimeFigureOut">
               <a:rPr lang="en-US" smtClean="0"/>
-              <a:t>11/16/2019</a:t>
+              <a:t>11/25/2019</a:t>
             </a:fld>
             <a:endParaRPr lang="en-US"/>
           </a:p>
@@ -5207,7 +5207,7 @@
           <a:p>
             <a:fld id="{A35A536D-C9E9-4036-ACC9-B934A19DE91F}" type="datetimeFigureOut">
               <a:rPr lang="en-US" smtClean="0"/>
-              <a:t>11/16/2019</a:t>
+              <a:t>11/25/2019</a:t>
             </a:fld>
             <a:endParaRPr lang="en-US"/>
           </a:p>
@@ -5431,7 +5431,7 @@
           <a:p>
             <a:fld id="{A35A536D-C9E9-4036-ACC9-B934A19DE91F}" type="datetimeFigureOut">
               <a:rPr lang="en-US" smtClean="0"/>
-              <a:t>11/16/2019</a:t>
+              <a:t>11/25/2019</a:t>
             </a:fld>
             <a:endParaRPr lang="en-US"/>
           </a:p>
@@ -6444,13 +6444,7 @@
               <a:rPr lang="en-US" sz="2400" b="1" dirty="0">
                 <a:latin typeface="+mj-lt"/>
               </a:rPr>
-              <a:t> </a:t>
-            </a:r>
-            <a:r>
-              <a:rPr lang="en-US" sz="2400" b="1" dirty="0">
-                <a:latin typeface="+mj-lt"/>
-              </a:rPr>
-              <a:t>Arguments and Result between Java &amp; Native Programs</a:t>
+              <a:t> Arguments and Result between Java &amp; Native Programs</a:t>
             </a:r>
           </a:p>
           <a:p>
@@ -8213,11 +8207,7 @@
                     <a:p>
                       <a:r>
                         <a:rPr lang="en-US" dirty="0" smtClean="0"/>
-                        <a:t>byte</a:t>
-                      </a:r>
-                      <a:r>
-                        <a:rPr lang="en-US" dirty="0" smtClean="0"/>
-                        <a:t>[]</a:t>
+                        <a:t>byte[]</a:t>
                       </a:r>
                       <a:endParaRPr lang="en-US" dirty="0"/>
                     </a:p>
@@ -8261,11 +8251,7 @@
                     <a:p>
                       <a:r>
                         <a:rPr lang="en-US" dirty="0" smtClean="0"/>
-                        <a:t>char</a:t>
-                      </a:r>
-                      <a:r>
-                        <a:rPr lang="en-US" dirty="0" smtClean="0"/>
-                        <a:t>[]</a:t>
+                        <a:t>char[]</a:t>
                       </a:r>
                       <a:endParaRPr lang="en-US" dirty="0"/>
                     </a:p>
@@ -8309,11 +8295,7 @@
                     <a:p>
                       <a:r>
                         <a:rPr lang="en-US" dirty="0" smtClean="0"/>
-                        <a:t>short</a:t>
-                      </a:r>
-                      <a:r>
-                        <a:rPr lang="en-US" dirty="0" smtClean="0"/>
-                        <a:t>[]</a:t>
+                        <a:t>short[]</a:t>
                       </a:r>
                       <a:endParaRPr lang="en-US" dirty="0"/>
                     </a:p>
@@ -8405,11 +8387,7 @@
                     <a:p>
                       <a:r>
                         <a:rPr lang="en-US" dirty="0" smtClean="0"/>
-                        <a:t>long</a:t>
-                      </a:r>
-                      <a:r>
-                        <a:rPr lang="en-US" dirty="0" smtClean="0"/>
-                        <a:t>[]</a:t>
+                        <a:t>long[]</a:t>
                       </a:r>
                       <a:endParaRPr lang="en-US" dirty="0"/>
                     </a:p>
@@ -8453,11 +8431,7 @@
                     <a:p>
                       <a:r>
                         <a:rPr lang="en-US" dirty="0" smtClean="0"/>
-                        <a:t>float</a:t>
-                      </a:r>
-                      <a:r>
-                        <a:rPr lang="en-US" dirty="0" smtClean="0"/>
-                        <a:t>[]</a:t>
+                        <a:t>float[]</a:t>
                       </a:r>
                       <a:endParaRPr lang="en-US" dirty="0"/>
                     </a:p>
@@ -8501,11 +8475,7 @@
                     <a:p>
                       <a:r>
                         <a:rPr lang="en-US" dirty="0" smtClean="0"/>
-                        <a:t>double</a:t>
-                      </a:r>
-                      <a:r>
-                        <a:rPr lang="en-US" dirty="0" smtClean="0"/>
-                        <a:t>[]</a:t>
+                        <a:t>double[]</a:t>
                       </a:r>
                       <a:endParaRPr lang="en-US" dirty="0"/>
                     </a:p>
@@ -8670,9 +8640,6 @@
               </a:rPr>
               <a:t>Passing Array of Primitives</a:t>
             </a:r>
-            <a:endParaRPr lang="en-US" sz="2400" b="1" dirty="0">
-              <a:latin typeface="+mj-lt"/>
-            </a:endParaRPr>
           </a:p>
           <a:p>
             <a:pPr marL="0" indent="0">
@@ -11865,11 +11832,6 @@
               </a:rPr>
               <a:t>field descriptor</a:t>
             </a:r>
-            <a:endParaRPr lang="en-US" dirty="0">
-              <a:solidFill>
-                <a:srgbClr val="FF0000"/>
-              </a:solidFill>
-            </a:endParaRPr>
           </a:p>
         </p:txBody>
       </p:sp>
@@ -13435,11 +13397,6 @@
               </a:rPr>
               <a:t> field descriptor</a:t>
             </a:r>
-            <a:endParaRPr lang="en-US" dirty="0">
-              <a:solidFill>
-                <a:srgbClr val="FF0000"/>
-              </a:solidFill>
-            </a:endParaRPr>
           </a:p>
         </p:txBody>
       </p:sp>
@@ -14025,15 +13982,7 @@
                     <a:p>
                       <a:r>
                         <a:rPr lang="en-US" dirty="0" smtClean="0"/>
-                        <a:t>Byte/</a:t>
-                      </a:r>
-                      <a:r>
-                        <a:rPr lang="en-US" dirty="0" smtClean="0"/>
-                        <a:t>byte</a:t>
-                      </a:r>
-                      <a:r>
-                        <a:rPr lang="en-US" dirty="0" smtClean="0"/>
-                        <a:t>[]</a:t>
+                        <a:t>Byte/byte[]</a:t>
                       </a:r>
                       <a:endParaRPr lang="en-US" dirty="0"/>
                     </a:p>
@@ -14099,15 +14048,7 @@
                     <a:p>
                       <a:r>
                         <a:rPr lang="en-US" dirty="0" smtClean="0"/>
-                        <a:t>Char/</a:t>
-                      </a:r>
-                      <a:r>
-                        <a:rPr lang="en-US" dirty="0" smtClean="0"/>
-                        <a:t>char</a:t>
-                      </a:r>
-                      <a:r>
-                        <a:rPr lang="en-US" dirty="0" smtClean="0"/>
-                        <a:t>[]</a:t>
+                        <a:t>Char/char[]</a:t>
                       </a:r>
                       <a:endParaRPr lang="en-US" dirty="0"/>
                     </a:p>
@@ -14173,15 +14114,7 @@
                     <a:p>
                       <a:r>
                         <a:rPr lang="en-US" dirty="0" smtClean="0"/>
-                        <a:t>Short/</a:t>
-                      </a:r>
-                      <a:r>
-                        <a:rPr lang="en-US" dirty="0" smtClean="0"/>
-                        <a:t>short</a:t>
-                      </a:r>
-                      <a:r>
-                        <a:rPr lang="en-US" dirty="0" smtClean="0"/>
-                        <a:t>[]</a:t>
+                        <a:t>Short/short[]</a:t>
                       </a:r>
                       <a:endParaRPr lang="en-US" dirty="0"/>
                     </a:p>
@@ -14325,15 +14258,7 @@
                     <a:p>
                       <a:r>
                         <a:rPr lang="en-US" dirty="0" smtClean="0"/>
-                        <a:t>long/</a:t>
-                      </a:r>
-                      <a:r>
-                        <a:rPr lang="en-US" dirty="0" smtClean="0"/>
-                        <a:t>long</a:t>
-                      </a:r>
-                      <a:r>
-                        <a:rPr lang="en-US" dirty="0" smtClean="0"/>
-                        <a:t>[]</a:t>
+                        <a:t>long/long[]</a:t>
                       </a:r>
                       <a:endParaRPr lang="en-US" dirty="0"/>
                     </a:p>
@@ -14411,15 +14336,7 @@
                       </a:r>
                       <a:r>
                         <a:rPr lang="en-US" dirty="0" smtClean="0"/>
-                        <a:t>/</a:t>
-                      </a:r>
-                      <a:r>
-                        <a:rPr lang="en-US" dirty="0" smtClean="0"/>
-                        <a:t>float</a:t>
-                      </a:r>
-                      <a:r>
-                        <a:rPr lang="en-US" dirty="0" smtClean="0"/>
-                        <a:t>[]</a:t>
+                        <a:t>/float[]</a:t>
                       </a:r>
                       <a:endParaRPr lang="en-US" dirty="0"/>
                     </a:p>
@@ -14485,15 +14402,7 @@
                     <a:p>
                       <a:r>
                         <a:rPr lang="en-US" dirty="0" smtClean="0"/>
-                        <a:t>Double/</a:t>
-                      </a:r>
-                      <a:r>
-                        <a:rPr lang="en-US" dirty="0" smtClean="0"/>
-                        <a:t>double</a:t>
-                      </a:r>
-                      <a:r>
-                        <a:rPr lang="en-US" dirty="0" smtClean="0"/>
-                        <a:t>[]</a:t>
+                        <a:t>Double/double[]</a:t>
                       </a:r>
                       <a:endParaRPr lang="en-US" dirty="0"/>
                     </a:p>
@@ -15676,11 +15585,6 @@
               </a:rPr>
               <a:t> field descriptor</a:t>
             </a:r>
-            <a:endParaRPr lang="en-US" dirty="0">
-              <a:solidFill>
-                <a:srgbClr val="FF0000"/>
-              </a:solidFill>
-            </a:endParaRPr>
           </a:p>
         </p:txBody>
       </p:sp>
@@ -16806,22 +16710,10 @@
               <a:t> </a:t>
             </a:r>
             <a:r>
-              <a:rPr lang="en-US" sz="1600" dirty="0" err="1">
-                <a:latin typeface="+mj-lt"/>
-              </a:rPr>
-              <a:t>Java_HelloJNI</a:t>
-            </a:r>
-            <a:r>
-              <a:rPr lang="en-US" sz="1600" dirty="0">
-                <a:latin typeface="+mj-lt"/>
-              </a:rPr>
-              <a:t>_ </a:t>
-            </a:r>
-            <a:r>
-              <a:rPr lang="en-US" sz="1600" dirty="0" err="1">
-                <a:latin typeface="+mj-lt"/>
-              </a:rPr>
-              <a:t>testCallbackMethod</a:t>
+              <a:rPr lang="en-US" sz="1600" smtClean="0">
+                <a:latin typeface="+mj-lt"/>
+              </a:rPr>
+              <a:t>Java_HelloJNI_testCallbackMethod</a:t>
             </a:r>
             <a:endParaRPr lang="en-US" sz="1600" dirty="0">
               <a:latin typeface="+mj-lt"/>
@@ -17425,11 +17317,6 @@
               </a:rPr>
               <a:t>descriptor</a:t>
             </a:r>
-            <a:endParaRPr lang="en-US" dirty="0">
-              <a:solidFill>
-                <a:srgbClr val="FF0000"/>
-              </a:solidFill>
-            </a:endParaRPr>
           </a:p>
         </p:txBody>
       </p:sp>
@@ -17719,13 +17606,7 @@
               <a:rPr lang="en-US" sz="2400" b="1" dirty="0">
                 <a:latin typeface="+mj-lt"/>
               </a:rPr>
-              <a:t>      </a:t>
-            </a:r>
-            <a:r>
-              <a:rPr lang="en-US" sz="2400" b="1" dirty="0">
-                <a:latin typeface="+mj-lt"/>
-              </a:rPr>
-              <a:t>2.2.2 Callback Static Methods</a:t>
+              <a:t>      2.2.2 Callback Static Methods</a:t>
             </a:r>
             <a:endParaRPr lang="en-US" sz="2400" b="1" dirty="0" smtClean="0">
               <a:latin typeface="+mj-lt"/>
@@ -18790,11 +18671,6 @@
               </a:rPr>
               <a:t>descriptor</a:t>
             </a:r>
-            <a:endParaRPr lang="en-US" dirty="0">
-              <a:solidFill>
-                <a:srgbClr val="FF0000"/>
-              </a:solidFill>
-            </a:endParaRPr>
           </a:p>
         </p:txBody>
       </p:sp>
@@ -19077,9 +18953,6 @@
               </a:rPr>
               <a:t>3.  Creating Objects and Object Arrays</a:t>
             </a:r>
-            <a:endParaRPr lang="en-US" sz="2400" b="1" dirty="0">
-              <a:latin typeface="+mj-lt"/>
-            </a:endParaRPr>
           </a:p>
           <a:p>
             <a:pPr marL="0" indent="0">
@@ -20293,9 +20166,6 @@
               </a:rPr>
               <a:t>3.  Creating Objects and Object Arrays</a:t>
             </a:r>
-            <a:endParaRPr lang="en-US" sz="2400" b="1" dirty="0">
-              <a:latin typeface="+mj-lt"/>
-            </a:endParaRPr>
           </a:p>
           <a:p>
             <a:pPr marL="0" indent="0">
@@ -21814,9 +21684,6 @@
               </a:rPr>
               <a:t>. Local and Global References</a:t>
             </a:r>
-            <a:endParaRPr lang="en-US" sz="2400" b="1" dirty="0">
-              <a:latin typeface="+mj-lt"/>
-            </a:endParaRPr>
           </a:p>
           <a:p>
             <a:pPr marL="0" indent="0">
@@ -23351,11 +23218,6 @@
               </a:rPr>
               <a:t>) returned by JNI functions are local references.</a:t>
             </a:r>
-            <a:endParaRPr lang="en-US" sz="1400" dirty="0">
-              <a:solidFill>
-                <a:srgbClr val="FF0000"/>
-              </a:solidFill>
-            </a:endParaRPr>
           </a:p>
         </p:txBody>
       </p:sp>
@@ -23601,9 +23463,6 @@
               </a:rPr>
               <a:t>. Local and Global References</a:t>
             </a:r>
-            <a:endParaRPr lang="en-US" sz="2400" b="1" dirty="0">
-              <a:latin typeface="+mj-lt"/>
-            </a:endParaRPr>
           </a:p>
           <a:p>
             <a:pPr marL="0" indent="0">
@@ -25833,7 +25692,7 @@
           <a:graphicData uri="http://schemas.openxmlformats.org/presentationml/2006/ole">
             <mc:AlternateContent xmlns:mc="http://schemas.openxmlformats.org/markup-compatibility/2006">
               <mc:Choice xmlns:v="urn:schemas-microsoft-com:vml" Requires="v">
-                <p:oleObj spid="_x0000_s6595" name="Packager Shell Object" showAsIcon="1" r:id="rId6" imgW="1396080" imgH="686880" progId="Package">
+                <p:oleObj spid="_x0000_s6596" name="Packager Shell Object" showAsIcon="1" r:id="rId6" imgW="1396080" imgH="686880" progId="Package">
                   <p:embed/>
                 </p:oleObj>
               </mc:Choice>
@@ -26847,15 +26706,7 @@
                   <a:schemeClr val="accent2"/>
                 </a:solidFill>
               </a:rPr>
-              <a:t>Introduce about JNI </a:t>
-            </a:r>
-            <a:r>
-              <a:rPr lang="en-US" sz="3600" b="1" dirty="0">
-                <a:solidFill>
-                  <a:schemeClr val="accent2"/>
-                </a:solidFill>
-              </a:rPr>
-              <a:t>(simple </a:t>
+              <a:t>Introduce about JNI (simple </a:t>
             </a:r>
             <a:r>
               <a:rPr lang="en-US" sz="3600" b="1" dirty="0" smtClean="0">
@@ -27786,7 +27637,7 @@
           <a:graphicData uri="http://schemas.openxmlformats.org/presentationml/2006/ole">
             <mc:AlternateContent xmlns:mc="http://schemas.openxmlformats.org/markup-compatibility/2006">
               <mc:Choice xmlns:v="urn:schemas-microsoft-com:vml" Requires="v">
-                <p:oleObj spid="_x0000_s8547" name="Packager Shell Object" showAsIcon="1" r:id="rId4" imgW="1599120" imgH="686880" progId="Package">
+                <p:oleObj spid="_x0000_s8548" name="Packager Shell Object" showAsIcon="1" r:id="rId4" imgW="1599120" imgH="686880" progId="Package">
                   <p:embed/>
                 </p:oleObj>
               </mc:Choice>
@@ -28096,7 +27947,7 @@
   <a:extraClrSchemeLst/>
   <a:extLst>
     <a:ext uri="{05A4C25C-085E-4340-85A3-A5531E510DB2}">
-      <thm15:themeFamily xmlns="" xmlns:thm15="http://schemas.microsoft.com/office/thememl/2012/main" name="Office Theme" id="{62F939B6-93AF-4DB8-9C6B-D6C7DFDC589F}" vid="{4A3C46E8-61CC-4603-A589-7422A47A8E4A}"/>
+      <thm15:themeFamily xmlns:thm15="http://schemas.microsoft.com/office/thememl/2012/main" name="Office Theme" id="{62F939B6-93AF-4DB8-9C6B-D6C7DFDC589F}" vid="{4A3C46E8-61CC-4603-A589-7422A47A8E4A}"/>
     </a:ext>
   </a:extLst>
 </a:theme>
@@ -28357,7 +28208,7 @@
   <a:extraClrSchemeLst/>
   <a:extLst>
     <a:ext uri="{05A4C25C-085E-4340-85A3-A5531E510DB2}">
-      <thm15:themeFamily xmlns="" xmlns:thm15="http://schemas.microsoft.com/office/thememl/2012/main" name="Office Theme" id="{62F939B6-93AF-4DB8-9C6B-D6C7DFDC589F}" vid="{4A3C46E8-61CC-4603-A589-7422A47A8E4A}"/>
+      <thm15:themeFamily xmlns:thm15="http://schemas.microsoft.com/office/thememl/2012/main" name="Office Theme" id="{62F939B6-93AF-4DB8-9C6B-D6C7DFDC589F}" vid="{4A3C46E8-61CC-4603-A589-7422A47A8E4A}"/>
     </a:ext>
   </a:extLst>
 </a:theme>

</xml_diff>